<commit_message>
Upload latest version of CS pptx
</commit_message>
<xml_diff>
--- a/Report/Computer_Scientist_Retrieval.pptx
+++ b/Report/Computer_Scientist_Retrieval.pptx
@@ -1,6 +1,6 @@
 
 <file path=ppt/presentation.xml><?xml version="1.0" encoding="utf-8"?>
-<p:presentation xmlns:a="http://schemas.openxmlformats.org/drawingml/2006/main" xmlns:r="http://schemas.openxmlformats.org/officeDocument/2006/relationships" xmlns:p="http://schemas.openxmlformats.org/presentationml/2006/main" saveSubsetFonts="1">
+<p:presentation xmlns:a="http://schemas.openxmlformats.org/drawingml/2006/main" xmlns:r="http://schemas.openxmlformats.org/officeDocument/2006/relationships" xmlns:p="http://schemas.openxmlformats.org/presentationml/2006/main" firstSlideNum="0" showSpecialPlsOnTitleSld="0" saveSubsetFonts="1">
   <p:sldMasterIdLst>
     <p:sldMasterId id="2147483648" r:id="rId1"/>
   </p:sldMasterIdLst>
@@ -9158,6 +9158,7 @@
     <p:sldLayoutId id="2147483697" r:id="rId48"/>
     <p:sldLayoutId id="2147483698" r:id="rId49"/>
   </p:sldLayoutIdLst>
+  <p:hf hdr="0" ftr="0" dt="0"/>
   <p:txStyles>
     <p:titleStyle>
       <a:lvl1pPr algn="l" defTabSz="914400" rtl="0" eaLnBrk="1" latinLnBrk="0" hangingPunct="1">
@@ -9754,6 +9755,42 @@
           </a:p>
         </p:txBody>
       </p:sp>
+      <p:pic>
+        <p:nvPicPr>
+          <p:cNvPr id="4" name="Immagine 3">
+            <a:extLst>
+              <a:ext uri="{FF2B5EF4-FFF2-40B4-BE49-F238E27FC236}">
+                <a16:creationId xmlns:a16="http://schemas.microsoft.com/office/drawing/2014/main" id="{027793D7-F228-894B-9707-CCDC58F0E73C}"/>
+              </a:ext>
+            </a:extLst>
+          </p:cNvPr>
+          <p:cNvPicPr>
+            <a:picLocks noChangeAspect="1"/>
+          </p:cNvPicPr>
+          <p:nvPr/>
+        </p:nvPicPr>
+        <p:blipFill>
+          <a:blip r:embed="rId5">
+            <a:extLst>
+              <a:ext uri="{28A0092B-C50C-407E-A947-70E740481C1C}">
+                <a14:useLocalDpi xmlns:a14="http://schemas.microsoft.com/office/drawing/2010/main" val="0"/>
+              </a:ext>
+            </a:extLst>
+          </a:blip>
+          <a:stretch>
+            <a:fillRect/>
+          </a:stretch>
+        </p:blipFill>
+        <p:spPr>
+          <a:xfrm>
+            <a:off x="9440690" y="6278611"/>
+            <a:ext cx="2215899" cy="412047"/>
+          </a:xfrm>
+          <a:prstGeom prst="rect">
+            <a:avLst/>
+          </a:prstGeom>
+        </p:spPr>
+      </p:pic>
     </p:spTree>
     <p:extLst>
       <p:ext uri="{BB962C8B-B14F-4D97-AF65-F5344CB8AC3E}">
@@ -28351,7 +28388,7 @@
           </p:cNvPicPr>
           <p:nvPr/>
         </p:nvPicPr>
-        <p:blipFill>
+        <p:blipFill rotWithShape="1">
           <a:blip r:embed="rId4">
             <a:extLst>
               <a:ext uri="{28A0092B-C50C-407E-A947-70E740481C1C}">
@@ -28359,14 +28396,13 @@
               </a:ext>
             </a:extLst>
           </a:blip>
-          <a:stretch>
-            <a:fillRect/>
-          </a:stretch>
+          <a:srcRect t="626"/>
+          <a:stretch/>
         </p:blipFill>
         <p:spPr>
           <a:xfrm>
-            <a:off x="107459" y="0"/>
-            <a:ext cx="4848896" cy="6858000"/>
+            <a:off x="107459" y="42964"/>
+            <a:ext cx="4848896" cy="6815035"/>
           </a:xfrm>
           <a:prstGeom prst="rect">
             <a:avLst/>
@@ -29453,36 +29489,6 @@
           </a:p>
         </p:txBody>
       </p:sp>
-      <p:pic>
-        <p:nvPicPr>
-          <p:cNvPr id="6" name="Immagine 5">
-            <a:extLst>
-              <a:ext uri="{FF2B5EF4-FFF2-40B4-BE49-F238E27FC236}">
-                <a16:creationId xmlns:a16="http://schemas.microsoft.com/office/drawing/2014/main" id="{DDEC66BC-D82E-9747-8805-31665F7BC263}"/>
-              </a:ext>
-            </a:extLst>
-          </p:cNvPr>
-          <p:cNvPicPr>
-            <a:picLocks noChangeAspect="1"/>
-          </p:cNvPicPr>
-          <p:nvPr/>
-        </p:nvPicPr>
-        <p:blipFill>
-          <a:blip r:embed="rId2"/>
-          <a:stretch>
-            <a:fillRect/>
-          </a:stretch>
-        </p:blipFill>
-        <p:spPr>
-          <a:xfrm>
-            <a:off x="6338412" y="1720879"/>
-            <a:ext cx="5156454" cy="3139229"/>
-          </a:xfrm>
-          <a:prstGeom prst="rect">
-            <a:avLst/>
-          </a:prstGeom>
-        </p:spPr>
-      </p:pic>
       <p:sp>
         <p:nvSpPr>
           <p:cNvPr id="7" name="Rettangolo 6">
@@ -30125,7 +30131,7 @@
           <p:nvPr/>
         </p:nvPicPr>
         <p:blipFill>
-          <a:blip r:embed="rId3">
+          <a:blip r:embed="rId2">
             <a:extLst>
               <a:ext uri="{28A0092B-C50C-407E-A947-70E740481C1C}">
                 <a14:useLocalDpi xmlns:a14="http://schemas.microsoft.com/office/drawing/2010/main" val="0"/>
@@ -30140,6 +30146,42 @@
           <a:xfrm>
             <a:off x="10025504" y="340196"/>
             <a:ext cx="1570962" cy="966142"/>
+          </a:xfrm>
+          <a:prstGeom prst="rect">
+            <a:avLst/>
+          </a:prstGeom>
+        </p:spPr>
+      </p:pic>
+      <p:pic>
+        <p:nvPicPr>
+          <p:cNvPr id="14" name="Immagine 13">
+            <a:extLst>
+              <a:ext uri="{FF2B5EF4-FFF2-40B4-BE49-F238E27FC236}">
+                <a16:creationId xmlns:a16="http://schemas.microsoft.com/office/drawing/2014/main" id="{123AF799-41B6-8D4F-A9F1-EEEB33AA39CC}"/>
+              </a:ext>
+            </a:extLst>
+          </p:cNvPr>
+          <p:cNvPicPr>
+            <a:picLocks noChangeAspect="1"/>
+          </p:cNvPicPr>
+          <p:nvPr/>
+        </p:nvPicPr>
+        <p:blipFill>
+          <a:blip r:embed="rId3">
+            <a:extLst>
+              <a:ext uri="{28A0092B-C50C-407E-A947-70E740481C1C}">
+                <a14:useLocalDpi xmlns:a14="http://schemas.microsoft.com/office/drawing/2010/main" val="0"/>
+              </a:ext>
+            </a:extLst>
+          </a:blip>
+          <a:stretch>
+            <a:fillRect/>
+          </a:stretch>
+        </p:blipFill>
+        <p:spPr>
+          <a:xfrm>
+            <a:off x="6291607" y="1514395"/>
+            <a:ext cx="5495231" cy="3511546"/>
           </a:xfrm>
           <a:prstGeom prst="rect">
             <a:avLst/>
@@ -30469,14 +30511,14 @@
             </a:ln>
             <a:extLst>
               <a:ext uri="{909E8E84-426E-40dd-AFC4-6F175D3DCCD1}">
-                <a14:hiddenFill xmlns:a14="http://schemas.microsoft.com/office/drawing/2010/main" xmlns="">
+                <a14:hiddenFill xmlns="" xmlns:a14="http://schemas.microsoft.com/office/drawing/2010/main">
                   <a:solidFill>
                     <a:srgbClr val="FFFFFF"/>
                   </a:solidFill>
                 </a14:hiddenFill>
               </a:ext>
               <a:ext uri="{91240B29-F687-4f45-9708-019B960494DF}">
-                <a14:hiddenLine xmlns:a14="http://schemas.microsoft.com/office/drawing/2010/main" xmlns="" w="12700">
+                <a14:hiddenLine xmlns="" xmlns:a14="http://schemas.microsoft.com/office/drawing/2010/main" w="12700">
                   <a:solidFill>
                     <a:schemeClr val="tx1"/>
                   </a:solidFill>
@@ -30791,14 +30833,14 @@
             </a:ln>
             <a:extLst>
               <a:ext uri="{909E8E84-426E-40dd-AFC4-6F175D3DCCD1}">
-                <a14:hiddenFill xmlns:a14="http://schemas.microsoft.com/office/drawing/2010/main" xmlns="">
+                <a14:hiddenFill xmlns="" xmlns:a14="http://schemas.microsoft.com/office/drawing/2010/main">
                   <a:solidFill>
                     <a:srgbClr val="FFFFFF"/>
                   </a:solidFill>
                 </a14:hiddenFill>
               </a:ext>
               <a:ext uri="{91240B29-F687-4f45-9708-019B960494DF}">
-                <a14:hiddenLine xmlns:a14="http://schemas.microsoft.com/office/drawing/2010/main" xmlns="" w="12700">
+                <a14:hiddenLine xmlns="" xmlns:a14="http://schemas.microsoft.com/office/drawing/2010/main" w="12700">
                   <a:solidFill>
                     <a:schemeClr val="tx1"/>
                   </a:solidFill>
@@ -31113,14 +31155,14 @@
             </a:ln>
             <a:extLst>
               <a:ext uri="{909E8E84-426E-40dd-AFC4-6F175D3DCCD1}">
-                <a14:hiddenFill xmlns:a14="http://schemas.microsoft.com/office/drawing/2010/main" xmlns="">
+                <a14:hiddenFill xmlns="" xmlns:a14="http://schemas.microsoft.com/office/drawing/2010/main">
                   <a:solidFill>
                     <a:srgbClr val="FFFFFF"/>
                   </a:solidFill>
                 </a14:hiddenFill>
               </a:ext>
               <a:ext uri="{91240B29-F687-4f45-9708-019B960494DF}">
-                <a14:hiddenLine xmlns:a14="http://schemas.microsoft.com/office/drawing/2010/main" xmlns="" w="12700">
+                <a14:hiddenLine xmlns="" xmlns:a14="http://schemas.microsoft.com/office/drawing/2010/main" w="12700">
                   <a:solidFill>
                     <a:schemeClr val="tx1"/>
                   </a:solidFill>
@@ -31435,14 +31477,14 @@
             </a:ln>
             <a:extLst>
               <a:ext uri="{909E8E84-426E-40dd-AFC4-6F175D3DCCD1}">
-                <a14:hiddenFill xmlns:a14="http://schemas.microsoft.com/office/drawing/2010/main" xmlns="">
+                <a14:hiddenFill xmlns="" xmlns:a14="http://schemas.microsoft.com/office/drawing/2010/main">
                   <a:solidFill>
                     <a:srgbClr val="FFFFFF"/>
                   </a:solidFill>
                 </a14:hiddenFill>
               </a:ext>
               <a:ext uri="{91240B29-F687-4f45-9708-019B960494DF}">
-                <a14:hiddenLine xmlns:a14="http://schemas.microsoft.com/office/drawing/2010/main" xmlns="" w="12700">
+                <a14:hiddenLine xmlns="" xmlns:a14="http://schemas.microsoft.com/office/drawing/2010/main" w="12700">
                   <a:solidFill>
                     <a:schemeClr val="tx1"/>
                   </a:solidFill>

</xml_diff>